<commit_message>
Added workflow diagram, misc changes
</commit_message>
<xml_diff>
--- a/images/experiments/svg_template.pptx
+++ b/images/experiments/svg_template.pptx
@@ -115,7 +115,7 @@
 <file path=ppt/revisionInfo.xml><?xml version="1.0" encoding="utf-8"?>
 <p1510:revInfo xmlns:a="http://schemas.openxmlformats.org/drawingml/2006/main" xmlns:r="http://schemas.openxmlformats.org/officeDocument/2006/relationships" xmlns:p1510="http://schemas.microsoft.com/office/powerpoint/2015/10/main">
   <p1510:revLst>
-    <p1510:client id="{F6540EED-7EC4-4CE2-BCD2-8A52ACCFB0D8}" v="15" dt="2022-06-17T15:43:53.665"/>
+    <p1510:client id="{F6540EED-7EC4-4CE2-BCD2-8A52ACCFB0D8}" v="20" dt="2022-06-17T16:32:40.972"/>
   </p1510:revLst>
 </p1510:revInfo>
 </file>
@@ -125,18 +125,18 @@
   <pc:docChgLst>
     <pc:chgData name="Nikkel Mollenhauer" userId="c1ec013b5ec7a53d" providerId="LiveId" clId="{F6540EED-7EC4-4CE2-BCD2-8A52ACCFB0D8}"/>
     <pc:docChg chg="custSel modSld">
-      <pc:chgData name="Nikkel Mollenhauer" userId="c1ec013b5ec7a53d" providerId="LiveId" clId="{F6540EED-7EC4-4CE2-BCD2-8A52ACCFB0D8}" dt="2022-06-17T15:43:53.664" v="16" actId="14826"/>
+      <pc:chgData name="Nikkel Mollenhauer" userId="c1ec013b5ec7a53d" providerId="LiveId" clId="{F6540EED-7EC4-4CE2-BCD2-8A52ACCFB0D8}" dt="2022-06-17T16:32:40.971" v="21" actId="14826"/>
       <pc:docMkLst>
         <pc:docMk/>
       </pc:docMkLst>
       <pc:sldChg chg="delSp modSp mod">
-        <pc:chgData name="Nikkel Mollenhauer" userId="c1ec013b5ec7a53d" providerId="LiveId" clId="{F6540EED-7EC4-4CE2-BCD2-8A52ACCFB0D8}" dt="2022-06-17T15:43:53.664" v="16" actId="14826"/>
+        <pc:chgData name="Nikkel Mollenhauer" userId="c1ec013b5ec7a53d" providerId="LiveId" clId="{F6540EED-7EC4-4CE2-BCD2-8A52ACCFB0D8}" dt="2022-06-17T16:32:40.971" v="21" actId="14826"/>
         <pc:sldMkLst>
           <pc:docMk/>
           <pc:sldMk cId="1107165603" sldId="256"/>
         </pc:sldMkLst>
         <pc:picChg chg="mod">
-          <ac:chgData name="Nikkel Mollenhauer" userId="c1ec013b5ec7a53d" providerId="LiveId" clId="{F6540EED-7EC4-4CE2-BCD2-8A52ACCFB0D8}" dt="2022-06-17T15:43:53.664" v="16" actId="14826"/>
+          <ac:chgData name="Nikkel Mollenhauer" userId="c1ec013b5ec7a53d" providerId="LiveId" clId="{F6540EED-7EC4-4CE2-BCD2-8A52ACCFB0D8}" dt="2022-06-17T16:32:40.971" v="21" actId="14826"/>
           <ac:picMkLst>
             <pc:docMk/>
             <pc:sldMk cId="1107165603" sldId="256"/>
@@ -3046,8 +3046,8 @@
         </p:blipFill>
         <p:spPr>
           <a:xfrm>
-            <a:off x="-1" y="-178334"/>
-            <a:ext cx="6478985" cy="4864514"/>
+            <a:off x="0" y="-178334"/>
+            <a:ext cx="6478983" cy="4864514"/>
           </a:xfrm>
           <a:prstGeom prst="rect">
             <a:avLst/>

</xml_diff>

<commit_message>
Moved sections, switched graphs
</commit_message>
<xml_diff>
--- a/images/experiments/svg_template.pptx
+++ b/images/experiments/svg_template.pptx
@@ -115,7 +115,7 @@
 <file path=ppt/revisionInfo.xml><?xml version="1.0" encoding="utf-8"?>
 <p1510:revInfo xmlns:a="http://schemas.openxmlformats.org/drawingml/2006/main" xmlns:r="http://schemas.openxmlformats.org/officeDocument/2006/relationships" xmlns:p1510="http://schemas.microsoft.com/office/powerpoint/2015/10/main">
   <p1510:revLst>
-    <p1510:client id="{711BDB89-75D9-4B82-966F-934A667302EC}" v="2" dt="2022-06-20T09:04:12.925"/>
+    <p1510:client id="{711BDB89-75D9-4B82-966F-934A667302EC}" v="22" dt="2022-06-22T13:16:56.171"/>
   </p1510:revLst>
 </p1510:revInfo>
 </file>
@@ -125,18 +125,18 @@
   <pc:docChgLst>
     <pc:chgData name="Nikkel Mollenhauer" userId="c1ec013b5ec7a53d" providerId="LiveId" clId="{711BDB89-75D9-4B82-966F-934A667302EC}"/>
     <pc:docChg chg="modSld">
-      <pc:chgData name="Nikkel Mollenhauer" userId="c1ec013b5ec7a53d" providerId="LiveId" clId="{711BDB89-75D9-4B82-966F-934A667302EC}" dt="2022-06-20T09:04:12.924" v="1" actId="14826"/>
+      <pc:chgData name="Nikkel Mollenhauer" userId="c1ec013b5ec7a53d" providerId="LiveId" clId="{711BDB89-75D9-4B82-966F-934A667302EC}" dt="2022-06-22T13:16:56.171" v="21" actId="14826"/>
       <pc:docMkLst>
         <pc:docMk/>
       </pc:docMkLst>
       <pc:sldChg chg="modSp">
-        <pc:chgData name="Nikkel Mollenhauer" userId="c1ec013b5ec7a53d" providerId="LiveId" clId="{711BDB89-75D9-4B82-966F-934A667302EC}" dt="2022-06-20T09:04:12.924" v="1" actId="14826"/>
+        <pc:chgData name="Nikkel Mollenhauer" userId="c1ec013b5ec7a53d" providerId="LiveId" clId="{711BDB89-75D9-4B82-966F-934A667302EC}" dt="2022-06-22T13:16:56.171" v="21" actId="14826"/>
         <pc:sldMkLst>
           <pc:docMk/>
           <pc:sldMk cId="1107165603" sldId="256"/>
         </pc:sldMkLst>
         <pc:picChg chg="mod">
-          <ac:chgData name="Nikkel Mollenhauer" userId="c1ec013b5ec7a53d" providerId="LiveId" clId="{711BDB89-75D9-4B82-966F-934A667302EC}" dt="2022-06-20T09:04:12.924" v="1" actId="14826"/>
+          <ac:chgData name="Nikkel Mollenhauer" userId="c1ec013b5ec7a53d" providerId="LiveId" clId="{711BDB89-75D9-4B82-966F-934A667302EC}" dt="2022-06-22T13:16:56.171" v="21" actId="14826"/>
           <ac:picMkLst>
             <pc:docMk/>
             <pc:sldMk cId="1107165603" sldId="256"/>
@@ -312,7 +312,7 @@
           <a:p>
             <a:fld id="{8557B4ED-93EE-46C5-9353-58A17C588CE7}" type="datetimeFigureOut">
               <a:rPr lang="en-GB" smtClean="0"/>
-              <a:t>20/06/22</a:t>
+              <a:t>22/06/22</a:t>
             </a:fld>
             <a:endParaRPr lang="en-GB"/>
           </a:p>
@@ -482,7 +482,7 @@
           <a:p>
             <a:fld id="{8557B4ED-93EE-46C5-9353-58A17C588CE7}" type="datetimeFigureOut">
               <a:rPr lang="en-GB" smtClean="0"/>
-              <a:t>20/06/22</a:t>
+              <a:t>22/06/22</a:t>
             </a:fld>
             <a:endParaRPr lang="en-GB"/>
           </a:p>
@@ -662,7 +662,7 @@
           <a:p>
             <a:fld id="{8557B4ED-93EE-46C5-9353-58A17C588CE7}" type="datetimeFigureOut">
               <a:rPr lang="en-GB" smtClean="0"/>
-              <a:t>20/06/22</a:t>
+              <a:t>22/06/22</a:t>
             </a:fld>
             <a:endParaRPr lang="en-GB"/>
           </a:p>
@@ -832,7 +832,7 @@
           <a:p>
             <a:fld id="{8557B4ED-93EE-46C5-9353-58A17C588CE7}" type="datetimeFigureOut">
               <a:rPr lang="en-GB" smtClean="0"/>
-              <a:t>20/06/22</a:t>
+              <a:t>22/06/22</a:t>
             </a:fld>
             <a:endParaRPr lang="en-GB"/>
           </a:p>
@@ -1076,7 +1076,7 @@
           <a:p>
             <a:fld id="{8557B4ED-93EE-46C5-9353-58A17C588CE7}" type="datetimeFigureOut">
               <a:rPr lang="en-GB" smtClean="0"/>
-              <a:t>20/06/22</a:t>
+              <a:t>22/06/22</a:t>
             </a:fld>
             <a:endParaRPr lang="en-GB"/>
           </a:p>
@@ -1308,7 +1308,7 @@
           <a:p>
             <a:fld id="{8557B4ED-93EE-46C5-9353-58A17C588CE7}" type="datetimeFigureOut">
               <a:rPr lang="en-GB" smtClean="0"/>
-              <a:t>20/06/22</a:t>
+              <a:t>22/06/22</a:t>
             </a:fld>
             <a:endParaRPr lang="en-GB"/>
           </a:p>
@@ -1675,7 +1675,7 @@
           <a:p>
             <a:fld id="{8557B4ED-93EE-46C5-9353-58A17C588CE7}" type="datetimeFigureOut">
               <a:rPr lang="en-GB" smtClean="0"/>
-              <a:t>20/06/22</a:t>
+              <a:t>22/06/22</a:t>
             </a:fld>
             <a:endParaRPr lang="en-GB"/>
           </a:p>
@@ -1793,7 +1793,7 @@
           <a:p>
             <a:fld id="{8557B4ED-93EE-46C5-9353-58A17C588CE7}" type="datetimeFigureOut">
               <a:rPr lang="en-GB" smtClean="0"/>
-              <a:t>20/06/22</a:t>
+              <a:t>22/06/22</a:t>
             </a:fld>
             <a:endParaRPr lang="en-GB"/>
           </a:p>
@@ -1888,7 +1888,7 @@
           <a:p>
             <a:fld id="{8557B4ED-93EE-46C5-9353-58A17C588CE7}" type="datetimeFigureOut">
               <a:rPr lang="en-GB" smtClean="0"/>
-              <a:t>20/06/22</a:t>
+              <a:t>22/06/22</a:t>
             </a:fld>
             <a:endParaRPr lang="en-GB"/>
           </a:p>
@@ -2165,7 +2165,7 @@
           <a:p>
             <a:fld id="{8557B4ED-93EE-46C5-9353-58A17C588CE7}" type="datetimeFigureOut">
               <a:rPr lang="en-GB" smtClean="0"/>
-              <a:t>20/06/22</a:t>
+              <a:t>22/06/22</a:t>
             </a:fld>
             <a:endParaRPr lang="en-GB"/>
           </a:p>
@@ -2422,7 +2422,7 @@
           <a:p>
             <a:fld id="{8557B4ED-93EE-46C5-9353-58A17C588CE7}" type="datetimeFigureOut">
               <a:rPr lang="en-GB" smtClean="0"/>
-              <a:t>20/06/22</a:t>
+              <a:t>22/06/22</a:t>
             </a:fld>
             <a:endParaRPr lang="en-GB"/>
           </a:p>
@@ -2635,7 +2635,7 @@
           <a:p>
             <a:fld id="{8557B4ED-93EE-46C5-9353-58A17C588CE7}" type="datetimeFigureOut">
               <a:rPr lang="en-GB" smtClean="0"/>
-              <a:t>20/06/22</a:t>
+              <a:t>22/06/22</a:t>
             </a:fld>
             <a:endParaRPr lang="en-GB"/>
           </a:p>
@@ -3071,7 +3071,7 @@
         <p:spPr>
           <a:xfrm>
             <a:off x="0" y="-178334"/>
-            <a:ext cx="6478983" cy="4864513"/>
+            <a:ext cx="6478982" cy="4864513"/>
           </a:xfrm>
           <a:prstGeom prst="rect">
             <a:avLst/>

</xml_diff>

<commit_message>
New diagrams for new experiment
</commit_message>
<xml_diff>
--- a/images/experiments/svg_template.pptx
+++ b/images/experiments/svg_template.pptx
@@ -115,7 +115,7 @@
 <file path=ppt/revisionInfo.xml><?xml version="1.0" encoding="utf-8"?>
 <p1510:revInfo xmlns:a="http://schemas.openxmlformats.org/drawingml/2006/main" xmlns:r="http://schemas.openxmlformats.org/officeDocument/2006/relationships" xmlns:p1510="http://schemas.microsoft.com/office/powerpoint/2015/10/main">
   <p1510:revLst>
-    <p1510:client id="{711BDB89-75D9-4B82-966F-934A667302EC}" v="22" dt="2022-06-22T13:16:56.171"/>
+    <p1510:client id="{711BDB89-75D9-4B82-966F-934A667302EC}" v="24" dt="2022-06-22T13:57:48.402"/>
   </p1510:revLst>
 </p1510:revInfo>
 </file>
@@ -124,19 +124,27 @@
 <pc:chgInfo xmlns:a="http://schemas.openxmlformats.org/drawingml/2006/main" xmlns:r="http://schemas.openxmlformats.org/officeDocument/2006/relationships" xmlns:ac="http://schemas.microsoft.com/office/drawing/2013/main/command" xmlns:pc="http://schemas.microsoft.com/office/powerpoint/2013/main/command">
   <pc:docChgLst>
     <pc:chgData name="Nikkel Mollenhauer" userId="c1ec013b5ec7a53d" providerId="LiveId" clId="{711BDB89-75D9-4B82-966F-934A667302EC}"/>
-    <pc:docChg chg="modSld">
-      <pc:chgData name="Nikkel Mollenhauer" userId="c1ec013b5ec7a53d" providerId="LiveId" clId="{711BDB89-75D9-4B82-966F-934A667302EC}" dt="2022-06-22T13:16:56.171" v="21" actId="14826"/>
+    <pc:docChg chg="undo custSel modSld">
+      <pc:chgData name="Nikkel Mollenhauer" userId="c1ec013b5ec7a53d" providerId="LiveId" clId="{711BDB89-75D9-4B82-966F-934A667302EC}" dt="2022-06-22T13:57:48.402" v="25" actId="14826"/>
       <pc:docMkLst>
         <pc:docMk/>
       </pc:docMkLst>
-      <pc:sldChg chg="modSp">
-        <pc:chgData name="Nikkel Mollenhauer" userId="c1ec013b5ec7a53d" providerId="LiveId" clId="{711BDB89-75D9-4B82-966F-934A667302EC}" dt="2022-06-22T13:16:56.171" v="21" actId="14826"/>
+      <pc:sldChg chg="addSp delSp modSp mod">
+        <pc:chgData name="Nikkel Mollenhauer" userId="c1ec013b5ec7a53d" providerId="LiveId" clId="{711BDB89-75D9-4B82-966F-934A667302EC}" dt="2022-06-22T13:57:48.402" v="25" actId="14826"/>
         <pc:sldMkLst>
           <pc:docMk/>
           <pc:sldMk cId="1107165603" sldId="256"/>
         </pc:sldMkLst>
+        <pc:spChg chg="add del">
+          <ac:chgData name="Nikkel Mollenhauer" userId="c1ec013b5ec7a53d" providerId="LiveId" clId="{711BDB89-75D9-4B82-966F-934A667302EC}" dt="2022-06-22T13:55:45.754" v="23" actId="22"/>
+          <ac:spMkLst>
+            <pc:docMk/>
+            <pc:sldMk cId="1107165603" sldId="256"/>
+            <ac:spMk id="4" creationId="{7FDC6608-6014-D1FF-1F38-461EBF3D72CF}"/>
+          </ac:spMkLst>
+        </pc:spChg>
         <pc:picChg chg="mod">
-          <ac:chgData name="Nikkel Mollenhauer" userId="c1ec013b5ec7a53d" providerId="LiveId" clId="{711BDB89-75D9-4B82-966F-934A667302EC}" dt="2022-06-22T13:16:56.171" v="21" actId="14826"/>
+          <ac:chgData name="Nikkel Mollenhauer" userId="c1ec013b5ec7a53d" providerId="LiveId" clId="{711BDB89-75D9-4B82-966F-934A667302EC}" dt="2022-06-22T13:57:48.402" v="25" actId="14826"/>
           <ac:picMkLst>
             <pc:docMk/>
             <pc:sldMk cId="1107165603" sldId="256"/>
@@ -3071,7 +3079,7 @@
         <p:spPr>
           <a:xfrm>
             <a:off x="0" y="-178334"/>
-            <a:ext cx="6478982" cy="4864513"/>
+            <a:ext cx="6478982" cy="4864512"/>
           </a:xfrm>
           <a:prstGeom prst="rect">
             <a:avLst/>

</xml_diff>

<commit_message>
Exampleprinter experiment, started additional Agent-monitoring section
</commit_message>
<xml_diff>
--- a/images/experiments/svg_template.pptx
+++ b/images/experiments/svg_template.pptx
@@ -115,7 +115,7 @@
 <file path=ppt/revisionInfo.xml><?xml version="1.0" encoding="utf-8"?>
 <p1510:revInfo xmlns:a="http://schemas.openxmlformats.org/drawingml/2006/main" xmlns:r="http://schemas.openxmlformats.org/officeDocument/2006/relationships" xmlns:p1510="http://schemas.microsoft.com/office/powerpoint/2015/10/main">
   <p1510:revLst>
-    <p1510:client id="{711BDB89-75D9-4B82-966F-934A667302EC}" v="24" dt="2022-06-22T13:57:48.402"/>
+    <p1510:client id="{711BDB89-75D9-4B82-966F-934A667302EC}" v="22" dt="2022-06-22T13:16:56.171"/>
   </p1510:revLst>
 </p1510:revInfo>
 </file>
@@ -124,27 +124,19 @@
 <pc:chgInfo xmlns:a="http://schemas.openxmlformats.org/drawingml/2006/main" xmlns:r="http://schemas.openxmlformats.org/officeDocument/2006/relationships" xmlns:ac="http://schemas.microsoft.com/office/drawing/2013/main/command" xmlns:pc="http://schemas.microsoft.com/office/powerpoint/2013/main/command">
   <pc:docChgLst>
     <pc:chgData name="Nikkel Mollenhauer" userId="c1ec013b5ec7a53d" providerId="LiveId" clId="{711BDB89-75D9-4B82-966F-934A667302EC}"/>
-    <pc:docChg chg="undo custSel modSld">
-      <pc:chgData name="Nikkel Mollenhauer" userId="c1ec013b5ec7a53d" providerId="LiveId" clId="{711BDB89-75D9-4B82-966F-934A667302EC}" dt="2022-06-22T13:57:48.402" v="25" actId="14826"/>
+    <pc:docChg chg="modSld">
+      <pc:chgData name="Nikkel Mollenhauer" userId="c1ec013b5ec7a53d" providerId="LiveId" clId="{711BDB89-75D9-4B82-966F-934A667302EC}" dt="2022-06-22T13:16:56.171" v="21" actId="14826"/>
       <pc:docMkLst>
         <pc:docMk/>
       </pc:docMkLst>
-      <pc:sldChg chg="addSp delSp modSp mod">
-        <pc:chgData name="Nikkel Mollenhauer" userId="c1ec013b5ec7a53d" providerId="LiveId" clId="{711BDB89-75D9-4B82-966F-934A667302EC}" dt="2022-06-22T13:57:48.402" v="25" actId="14826"/>
+      <pc:sldChg chg="modSp">
+        <pc:chgData name="Nikkel Mollenhauer" userId="c1ec013b5ec7a53d" providerId="LiveId" clId="{711BDB89-75D9-4B82-966F-934A667302EC}" dt="2022-06-22T13:16:56.171" v="21" actId="14826"/>
         <pc:sldMkLst>
           <pc:docMk/>
           <pc:sldMk cId="1107165603" sldId="256"/>
         </pc:sldMkLst>
-        <pc:spChg chg="add del">
-          <ac:chgData name="Nikkel Mollenhauer" userId="c1ec013b5ec7a53d" providerId="LiveId" clId="{711BDB89-75D9-4B82-966F-934A667302EC}" dt="2022-06-22T13:55:45.754" v="23" actId="22"/>
-          <ac:spMkLst>
-            <pc:docMk/>
-            <pc:sldMk cId="1107165603" sldId="256"/>
-            <ac:spMk id="4" creationId="{7FDC6608-6014-D1FF-1F38-461EBF3D72CF}"/>
-          </ac:spMkLst>
-        </pc:spChg>
         <pc:picChg chg="mod">
-          <ac:chgData name="Nikkel Mollenhauer" userId="c1ec013b5ec7a53d" providerId="LiveId" clId="{711BDB89-75D9-4B82-966F-934A667302EC}" dt="2022-06-22T13:57:48.402" v="25" actId="14826"/>
+          <ac:chgData name="Nikkel Mollenhauer" userId="c1ec013b5ec7a53d" providerId="LiveId" clId="{711BDB89-75D9-4B82-966F-934A667302EC}" dt="2022-06-22T13:16:56.171" v="21" actId="14826"/>
           <ac:picMkLst>
             <pc:docMk/>
             <pc:sldMk cId="1107165603" sldId="256"/>
@@ -3079,7 +3071,7 @@
         <p:spPr>
           <a:xfrm>
             <a:off x="0" y="-178334"/>
-            <a:ext cx="6478982" cy="4864512"/>
+            <a:ext cx="6478982" cy="4864513"/>
           </a:xfrm>
           <a:prstGeom prst="rect">
             <a:avLst/>

</xml_diff>

<commit_message>
SAC-Agent with other Rule-Based competitor
</commit_message>
<xml_diff>
--- a/images/experiments/svg_template.pptx
+++ b/images/experiments/svg_template.pptx
@@ -116,7 +116,7 @@
 <p1510:revInfo xmlns:a="http://schemas.openxmlformats.org/drawingml/2006/main" xmlns:r="http://schemas.openxmlformats.org/officeDocument/2006/relationships" xmlns:p1510="http://schemas.microsoft.com/office/powerpoint/2015/10/main">
   <p1510:revLst>
     <p1510:client id="{711BDB89-75D9-4B82-966F-934A667302EC}" v="22" dt="2022-06-22T13:16:56.171"/>
-    <p1510:client id="{F6540EED-7EC4-4CE2-BCD2-8A52ACCFB0D8}" v="3" dt="2022-06-23T09:37:14.873"/>
+    <p1510:client id="{F6540EED-7EC4-4CE2-BCD2-8A52ACCFB0D8}" v="6" dt="2022-06-23T11:50:03.698"/>
   </p1510:revLst>
 </p1510:revInfo>
 </file>
@@ -150,18 +150,18 @@
   <pc:docChgLst>
     <pc:chgData name="Nikkel Mollenhauer" userId="c1ec013b5ec7a53d" providerId="LiveId" clId="{F6540EED-7EC4-4CE2-BCD2-8A52ACCFB0D8}"/>
     <pc:docChg chg="custSel modSld">
-      <pc:chgData name="Nikkel Mollenhauer" userId="c1ec013b5ec7a53d" providerId="LiveId" clId="{F6540EED-7EC4-4CE2-BCD2-8A52ACCFB0D8}" dt="2022-06-23T09:37:14.872" v="24" actId="14826"/>
+      <pc:chgData name="Nikkel Mollenhauer" userId="c1ec013b5ec7a53d" providerId="LiveId" clId="{F6540EED-7EC4-4CE2-BCD2-8A52ACCFB0D8}" dt="2022-06-23T11:50:03.698" v="27" actId="14826"/>
       <pc:docMkLst>
         <pc:docMk/>
       </pc:docMkLst>
       <pc:sldChg chg="delSp modSp mod">
-        <pc:chgData name="Nikkel Mollenhauer" userId="c1ec013b5ec7a53d" providerId="LiveId" clId="{F6540EED-7EC4-4CE2-BCD2-8A52ACCFB0D8}" dt="2022-06-23T09:37:14.872" v="24" actId="14826"/>
+        <pc:chgData name="Nikkel Mollenhauer" userId="c1ec013b5ec7a53d" providerId="LiveId" clId="{F6540EED-7EC4-4CE2-BCD2-8A52ACCFB0D8}" dt="2022-06-23T11:50:03.698" v="27" actId="14826"/>
         <pc:sldMkLst>
           <pc:docMk/>
           <pc:sldMk cId="1107165603" sldId="256"/>
         </pc:sldMkLst>
         <pc:picChg chg="mod">
-          <ac:chgData name="Nikkel Mollenhauer" userId="c1ec013b5ec7a53d" providerId="LiveId" clId="{F6540EED-7EC4-4CE2-BCD2-8A52ACCFB0D8}" dt="2022-06-23T09:37:14.872" v="24" actId="14826"/>
+          <ac:chgData name="Nikkel Mollenhauer" userId="c1ec013b5ec7a53d" providerId="LiveId" clId="{F6540EED-7EC4-4CE2-BCD2-8A52ACCFB0D8}" dt="2022-06-23T11:50:03.698" v="27" actId="14826"/>
           <ac:picMkLst>
             <pc:docMk/>
             <pc:sldMk cId="1107165603" sldId="256"/>
@@ -3072,7 +3072,7 @@
         <p:spPr>
           <a:xfrm>
             <a:off x="0" y="-178334"/>
-            <a:ext cx="6478982" cy="4864512"/>
+            <a:ext cx="6478981" cy="4864512"/>
           </a:xfrm>
           <a:prstGeom prst="rect">
             <a:avLst/>

</xml_diff>

<commit_message>
Policyanalyzer, cleaned up todos
</commit_message>
<xml_diff>
--- a/images/experiments/svg_template.pptx
+++ b/images/experiments/svg_template.pptx
@@ -115,8 +115,7 @@
 <file path=ppt/revisionInfo.xml><?xml version="1.0" encoding="utf-8"?>
 <p1510:revInfo xmlns:a="http://schemas.openxmlformats.org/drawingml/2006/main" xmlns:r="http://schemas.openxmlformats.org/officeDocument/2006/relationships" xmlns:p1510="http://schemas.microsoft.com/office/powerpoint/2015/10/main">
   <p1510:revLst>
-    <p1510:client id="{711BDB89-75D9-4B82-966F-934A667302EC}" v="22" dt="2022-06-22T13:16:56.171"/>
-    <p1510:client id="{F6540EED-7EC4-4CE2-BCD2-8A52ACCFB0D8}" v="6" dt="2022-06-23T11:50:03.698"/>
+    <p1510:client id="{F6540EED-7EC4-4CE2-BCD2-8A52ACCFB0D8}" v="10" dt="2022-06-23T14:09:30.666"/>
   </p1510:revLst>
 </p1510:revInfo>
 </file>
@@ -150,18 +149,18 @@
   <pc:docChgLst>
     <pc:chgData name="Nikkel Mollenhauer" userId="c1ec013b5ec7a53d" providerId="LiveId" clId="{F6540EED-7EC4-4CE2-BCD2-8A52ACCFB0D8}"/>
     <pc:docChg chg="custSel modSld">
-      <pc:chgData name="Nikkel Mollenhauer" userId="c1ec013b5ec7a53d" providerId="LiveId" clId="{F6540EED-7EC4-4CE2-BCD2-8A52ACCFB0D8}" dt="2022-06-23T11:50:03.698" v="27" actId="14826"/>
+      <pc:chgData name="Nikkel Mollenhauer" userId="c1ec013b5ec7a53d" providerId="LiveId" clId="{F6540EED-7EC4-4CE2-BCD2-8A52ACCFB0D8}" dt="2022-06-23T14:09:30.666" v="30" actId="14826"/>
       <pc:docMkLst>
         <pc:docMk/>
       </pc:docMkLst>
       <pc:sldChg chg="delSp modSp mod">
-        <pc:chgData name="Nikkel Mollenhauer" userId="c1ec013b5ec7a53d" providerId="LiveId" clId="{F6540EED-7EC4-4CE2-BCD2-8A52ACCFB0D8}" dt="2022-06-23T11:50:03.698" v="27" actId="14826"/>
+        <pc:chgData name="Nikkel Mollenhauer" userId="c1ec013b5ec7a53d" providerId="LiveId" clId="{F6540EED-7EC4-4CE2-BCD2-8A52ACCFB0D8}" dt="2022-06-23T14:09:30.666" v="30" actId="14826"/>
         <pc:sldMkLst>
           <pc:docMk/>
           <pc:sldMk cId="1107165603" sldId="256"/>
         </pc:sldMkLst>
         <pc:picChg chg="mod">
-          <ac:chgData name="Nikkel Mollenhauer" userId="c1ec013b5ec7a53d" providerId="LiveId" clId="{F6540EED-7EC4-4CE2-BCD2-8A52ACCFB0D8}" dt="2022-06-23T11:50:03.698" v="27" actId="14826"/>
+          <ac:chgData name="Nikkel Mollenhauer" userId="c1ec013b5ec7a53d" providerId="LiveId" clId="{F6540EED-7EC4-4CE2-BCD2-8A52ACCFB0D8}" dt="2022-06-23T14:09:30.666" v="30" actId="14826"/>
           <ac:picMkLst>
             <pc:docMk/>
             <pc:sldMk cId="1107165603" sldId="256"/>

</xml_diff>

<commit_message>
Reference Oligopoly experiment, \bfref
</commit_message>
<xml_diff>
--- a/images/experiments/svg_template.pptx
+++ b/images/experiments/svg_template.pptx
@@ -115,7 +115,7 @@
 <file path=ppt/revisionInfo.xml><?xml version="1.0" encoding="utf-8"?>
 <p1510:revInfo xmlns:a="http://schemas.openxmlformats.org/drawingml/2006/main" xmlns:r="http://schemas.openxmlformats.org/officeDocument/2006/relationships" xmlns:p1510="http://schemas.microsoft.com/office/powerpoint/2015/10/main">
   <p1510:revLst>
-    <p1510:client id="{F6540EED-7EC4-4CE2-BCD2-8A52ACCFB0D8}" v="10" dt="2022-06-23T14:09:30.666"/>
+    <p1510:client id="{F6540EED-7EC4-4CE2-BCD2-8A52ACCFB0D8}" v="11" dt="2022-06-23T16:45:34.332"/>
   </p1510:revLst>
 </p1510:revInfo>
 </file>
@@ -149,18 +149,18 @@
   <pc:docChgLst>
     <pc:chgData name="Nikkel Mollenhauer" userId="c1ec013b5ec7a53d" providerId="LiveId" clId="{F6540EED-7EC4-4CE2-BCD2-8A52ACCFB0D8}"/>
     <pc:docChg chg="custSel modSld">
-      <pc:chgData name="Nikkel Mollenhauer" userId="c1ec013b5ec7a53d" providerId="LiveId" clId="{F6540EED-7EC4-4CE2-BCD2-8A52ACCFB0D8}" dt="2022-06-23T14:09:30.666" v="30" actId="14826"/>
+      <pc:chgData name="Nikkel Mollenhauer" userId="c1ec013b5ec7a53d" providerId="LiveId" clId="{F6540EED-7EC4-4CE2-BCD2-8A52ACCFB0D8}" dt="2022-06-23T16:45:34.331" v="31" actId="14826"/>
       <pc:docMkLst>
         <pc:docMk/>
       </pc:docMkLst>
       <pc:sldChg chg="delSp modSp mod">
-        <pc:chgData name="Nikkel Mollenhauer" userId="c1ec013b5ec7a53d" providerId="LiveId" clId="{F6540EED-7EC4-4CE2-BCD2-8A52ACCFB0D8}" dt="2022-06-23T14:09:30.666" v="30" actId="14826"/>
+        <pc:chgData name="Nikkel Mollenhauer" userId="c1ec013b5ec7a53d" providerId="LiveId" clId="{F6540EED-7EC4-4CE2-BCD2-8A52ACCFB0D8}" dt="2022-06-23T16:45:34.331" v="31" actId="14826"/>
         <pc:sldMkLst>
           <pc:docMk/>
           <pc:sldMk cId="1107165603" sldId="256"/>
         </pc:sldMkLst>
         <pc:picChg chg="mod">
-          <ac:chgData name="Nikkel Mollenhauer" userId="c1ec013b5ec7a53d" providerId="LiveId" clId="{F6540EED-7EC4-4CE2-BCD2-8A52ACCFB0D8}" dt="2022-06-23T14:09:30.666" v="30" actId="14826"/>
+          <ac:chgData name="Nikkel Mollenhauer" userId="c1ec013b5ec7a53d" providerId="LiveId" clId="{F6540EED-7EC4-4CE2-BCD2-8A52ACCFB0D8}" dt="2022-06-23T16:45:34.331" v="31" actId="14826"/>
           <ac:picMkLst>
             <pc:docMk/>
             <pc:sldMk cId="1107165603" sldId="256"/>
@@ -3071,7 +3071,7 @@
         <p:spPr>
           <a:xfrm>
             <a:off x="0" y="-178334"/>
-            <a:ext cx="6478981" cy="4864512"/>
+            <a:ext cx="6478981" cy="4864511"/>
           </a:xfrm>
           <a:prstGeom prst="rect">
             <a:avLst/>

</xml_diff>

<commit_message>
Made Appendix figures all the same size
</commit_message>
<xml_diff>
--- a/images/experiments/svg_template.pptx
+++ b/images/experiments/svg_template.pptx
@@ -115,7 +115,7 @@
 <file path=ppt/revisionInfo.xml><?xml version="1.0" encoding="utf-8"?>
 <p1510:revInfo xmlns:a="http://schemas.openxmlformats.org/drawingml/2006/main" xmlns:r="http://schemas.openxmlformats.org/officeDocument/2006/relationships" xmlns:p1510="http://schemas.microsoft.com/office/powerpoint/2015/10/main">
   <p1510:revLst>
-    <p1510:client id="{F6540EED-7EC4-4CE2-BCD2-8A52ACCFB0D8}" v="11" dt="2022-06-23T16:45:34.332"/>
+    <p1510:client id="{F6540EED-7EC4-4CE2-BCD2-8A52ACCFB0D8}" v="19" dt="2022-06-25T15:08:06.403"/>
   </p1510:revLst>
 </p1510:revInfo>
 </file>
@@ -148,19 +148,27 @@
   </pc:docChgLst>
   <pc:docChgLst>
     <pc:chgData name="Nikkel Mollenhauer" userId="c1ec013b5ec7a53d" providerId="LiveId" clId="{F6540EED-7EC4-4CE2-BCD2-8A52ACCFB0D8}"/>
-    <pc:docChg chg="custSel modSld">
-      <pc:chgData name="Nikkel Mollenhauer" userId="c1ec013b5ec7a53d" providerId="LiveId" clId="{F6540EED-7EC4-4CE2-BCD2-8A52ACCFB0D8}" dt="2022-06-23T16:45:34.331" v="31" actId="14826"/>
+    <pc:docChg chg="undo custSel modSld modMainMaster">
+      <pc:chgData name="Nikkel Mollenhauer" userId="c1ec013b5ec7a53d" providerId="LiveId" clId="{F6540EED-7EC4-4CE2-BCD2-8A52ACCFB0D8}" dt="2022-06-25T15:08:06.677" v="46" actId="478"/>
       <pc:docMkLst>
         <pc:docMk/>
       </pc:docMkLst>
-      <pc:sldChg chg="delSp modSp mod">
-        <pc:chgData name="Nikkel Mollenhauer" userId="c1ec013b5ec7a53d" providerId="LiveId" clId="{F6540EED-7EC4-4CE2-BCD2-8A52ACCFB0D8}" dt="2022-06-23T16:45:34.331" v="31" actId="14826"/>
+      <pc:sldChg chg="addSp delSp modSp mod">
+        <pc:chgData name="Nikkel Mollenhauer" userId="c1ec013b5ec7a53d" providerId="LiveId" clId="{F6540EED-7EC4-4CE2-BCD2-8A52ACCFB0D8}" dt="2022-06-25T15:08:06.677" v="46" actId="478"/>
         <pc:sldMkLst>
           <pc:docMk/>
           <pc:sldMk cId="1107165603" sldId="256"/>
         </pc:sldMkLst>
-        <pc:picChg chg="mod">
-          <ac:chgData name="Nikkel Mollenhauer" userId="c1ec013b5ec7a53d" providerId="LiveId" clId="{F6540EED-7EC4-4CE2-BCD2-8A52ACCFB0D8}" dt="2022-06-23T16:45:34.331" v="31" actId="14826"/>
+        <pc:picChg chg="add del mod">
+          <ac:chgData name="Nikkel Mollenhauer" userId="c1ec013b5ec7a53d" providerId="LiveId" clId="{F6540EED-7EC4-4CE2-BCD2-8A52ACCFB0D8}" dt="2022-06-25T15:08:06.403" v="45" actId="931"/>
+          <ac:picMkLst>
+            <pc:docMk/>
+            <pc:sldMk cId="1107165603" sldId="256"/>
+            <ac:picMk id="3" creationId="{7E6A521F-CE0F-C496-7BB1-4A0820B0480B}"/>
+          </ac:picMkLst>
+        </pc:picChg>
+        <pc:picChg chg="add del mod">
+          <ac:chgData name="Nikkel Mollenhauer" userId="c1ec013b5ec7a53d" providerId="LiveId" clId="{F6540EED-7EC4-4CE2-BCD2-8A52ACCFB0D8}" dt="2022-06-25T15:08:06.677" v="46" actId="478"/>
           <ac:picMkLst>
             <pc:docMk/>
             <pc:sldMk cId="1107165603" sldId="256"/>
@@ -176,6 +184,280 @@
           </ac:picMkLst>
         </pc:picChg>
       </pc:sldChg>
+      <pc:sldMasterChg chg="modSp modSldLayout">
+        <pc:chgData name="Nikkel Mollenhauer" userId="c1ec013b5ec7a53d" providerId="LiveId" clId="{F6540EED-7EC4-4CE2-BCD2-8A52ACCFB0D8}" dt="2022-06-25T15:08:05.300" v="40"/>
+        <pc:sldMasterMkLst>
+          <pc:docMk/>
+          <pc:sldMasterMk cId="1562958951" sldId="2147483768"/>
+        </pc:sldMasterMkLst>
+        <pc:spChg chg="mod">
+          <ac:chgData name="Nikkel Mollenhauer" userId="c1ec013b5ec7a53d" providerId="LiveId" clId="{F6540EED-7EC4-4CE2-BCD2-8A52ACCFB0D8}" dt="2022-06-25T15:08:05.300" v="40"/>
+          <ac:spMkLst>
+            <pc:docMk/>
+            <pc:sldMasterMk cId="1562958951" sldId="2147483768"/>
+            <ac:spMk id="2" creationId="{00000000-0000-0000-0000-000000000000}"/>
+          </ac:spMkLst>
+        </pc:spChg>
+        <pc:spChg chg="mod">
+          <ac:chgData name="Nikkel Mollenhauer" userId="c1ec013b5ec7a53d" providerId="LiveId" clId="{F6540EED-7EC4-4CE2-BCD2-8A52ACCFB0D8}" dt="2022-06-25T15:08:05.300" v="40"/>
+          <ac:spMkLst>
+            <pc:docMk/>
+            <pc:sldMasterMk cId="1562958951" sldId="2147483768"/>
+            <ac:spMk id="3" creationId="{00000000-0000-0000-0000-000000000000}"/>
+          </ac:spMkLst>
+        </pc:spChg>
+        <pc:spChg chg="mod">
+          <ac:chgData name="Nikkel Mollenhauer" userId="c1ec013b5ec7a53d" providerId="LiveId" clId="{F6540EED-7EC4-4CE2-BCD2-8A52ACCFB0D8}" dt="2022-06-25T15:08:05.300" v="40"/>
+          <ac:spMkLst>
+            <pc:docMk/>
+            <pc:sldMasterMk cId="1562958951" sldId="2147483768"/>
+            <ac:spMk id="4" creationId="{00000000-0000-0000-0000-000000000000}"/>
+          </ac:spMkLst>
+        </pc:spChg>
+        <pc:spChg chg="mod">
+          <ac:chgData name="Nikkel Mollenhauer" userId="c1ec013b5ec7a53d" providerId="LiveId" clId="{F6540EED-7EC4-4CE2-BCD2-8A52ACCFB0D8}" dt="2022-06-25T15:08:05.300" v="40"/>
+          <ac:spMkLst>
+            <pc:docMk/>
+            <pc:sldMasterMk cId="1562958951" sldId="2147483768"/>
+            <ac:spMk id="5" creationId="{00000000-0000-0000-0000-000000000000}"/>
+          </ac:spMkLst>
+        </pc:spChg>
+        <pc:spChg chg="mod">
+          <ac:chgData name="Nikkel Mollenhauer" userId="c1ec013b5ec7a53d" providerId="LiveId" clId="{F6540EED-7EC4-4CE2-BCD2-8A52ACCFB0D8}" dt="2022-06-25T15:08:05.300" v="40"/>
+          <ac:spMkLst>
+            <pc:docMk/>
+            <pc:sldMasterMk cId="1562958951" sldId="2147483768"/>
+            <ac:spMk id="6" creationId="{00000000-0000-0000-0000-000000000000}"/>
+          </ac:spMkLst>
+        </pc:spChg>
+        <pc:sldLayoutChg chg="modSp">
+          <pc:chgData name="Nikkel Mollenhauer" userId="c1ec013b5ec7a53d" providerId="LiveId" clId="{F6540EED-7EC4-4CE2-BCD2-8A52ACCFB0D8}" dt="2022-06-25T15:08:05.300" v="40"/>
+          <pc:sldLayoutMkLst>
+            <pc:docMk/>
+            <pc:sldMasterMk cId="1562958951" sldId="2147483768"/>
+            <pc:sldLayoutMk cId="3320187959" sldId="2147483769"/>
+          </pc:sldLayoutMkLst>
+          <pc:spChg chg="mod">
+            <ac:chgData name="Nikkel Mollenhauer" userId="c1ec013b5ec7a53d" providerId="LiveId" clId="{F6540EED-7EC4-4CE2-BCD2-8A52ACCFB0D8}" dt="2022-06-25T15:08:05.300" v="40"/>
+            <ac:spMkLst>
+              <pc:docMk/>
+              <pc:sldMasterMk cId="1562958951" sldId="2147483768"/>
+              <pc:sldLayoutMk cId="3320187959" sldId="2147483769"/>
+              <ac:spMk id="2" creationId="{00000000-0000-0000-0000-000000000000}"/>
+            </ac:spMkLst>
+          </pc:spChg>
+          <pc:spChg chg="mod">
+            <ac:chgData name="Nikkel Mollenhauer" userId="c1ec013b5ec7a53d" providerId="LiveId" clId="{F6540EED-7EC4-4CE2-BCD2-8A52ACCFB0D8}" dt="2022-06-25T15:08:05.300" v="40"/>
+            <ac:spMkLst>
+              <pc:docMk/>
+              <pc:sldMasterMk cId="1562958951" sldId="2147483768"/>
+              <pc:sldLayoutMk cId="3320187959" sldId="2147483769"/>
+              <ac:spMk id="3" creationId="{00000000-0000-0000-0000-000000000000}"/>
+            </ac:spMkLst>
+          </pc:spChg>
+        </pc:sldLayoutChg>
+        <pc:sldLayoutChg chg="modSp">
+          <pc:chgData name="Nikkel Mollenhauer" userId="c1ec013b5ec7a53d" providerId="LiveId" clId="{F6540EED-7EC4-4CE2-BCD2-8A52ACCFB0D8}" dt="2022-06-25T15:08:05.300" v="40"/>
+          <pc:sldLayoutMkLst>
+            <pc:docMk/>
+            <pc:sldMasterMk cId="1562958951" sldId="2147483768"/>
+            <pc:sldLayoutMk cId="3232121112" sldId="2147483771"/>
+          </pc:sldLayoutMkLst>
+          <pc:spChg chg="mod">
+            <ac:chgData name="Nikkel Mollenhauer" userId="c1ec013b5ec7a53d" providerId="LiveId" clId="{F6540EED-7EC4-4CE2-BCD2-8A52ACCFB0D8}" dt="2022-06-25T15:08:05.300" v="40"/>
+            <ac:spMkLst>
+              <pc:docMk/>
+              <pc:sldMasterMk cId="1562958951" sldId="2147483768"/>
+              <pc:sldLayoutMk cId="3232121112" sldId="2147483771"/>
+              <ac:spMk id="2" creationId="{00000000-0000-0000-0000-000000000000}"/>
+            </ac:spMkLst>
+          </pc:spChg>
+          <pc:spChg chg="mod">
+            <ac:chgData name="Nikkel Mollenhauer" userId="c1ec013b5ec7a53d" providerId="LiveId" clId="{F6540EED-7EC4-4CE2-BCD2-8A52ACCFB0D8}" dt="2022-06-25T15:08:05.300" v="40"/>
+            <ac:spMkLst>
+              <pc:docMk/>
+              <pc:sldMasterMk cId="1562958951" sldId="2147483768"/>
+              <pc:sldLayoutMk cId="3232121112" sldId="2147483771"/>
+              <ac:spMk id="3" creationId="{00000000-0000-0000-0000-000000000000}"/>
+            </ac:spMkLst>
+          </pc:spChg>
+        </pc:sldLayoutChg>
+        <pc:sldLayoutChg chg="modSp">
+          <pc:chgData name="Nikkel Mollenhauer" userId="c1ec013b5ec7a53d" providerId="LiveId" clId="{F6540EED-7EC4-4CE2-BCD2-8A52ACCFB0D8}" dt="2022-06-25T15:08:05.300" v="40"/>
+          <pc:sldLayoutMkLst>
+            <pc:docMk/>
+            <pc:sldMasterMk cId="1562958951" sldId="2147483768"/>
+            <pc:sldLayoutMk cId="3291995468" sldId="2147483772"/>
+          </pc:sldLayoutMkLst>
+          <pc:spChg chg="mod">
+            <ac:chgData name="Nikkel Mollenhauer" userId="c1ec013b5ec7a53d" providerId="LiveId" clId="{F6540EED-7EC4-4CE2-BCD2-8A52ACCFB0D8}" dt="2022-06-25T15:08:05.300" v="40"/>
+            <ac:spMkLst>
+              <pc:docMk/>
+              <pc:sldMasterMk cId="1562958951" sldId="2147483768"/>
+              <pc:sldLayoutMk cId="3291995468" sldId="2147483772"/>
+              <ac:spMk id="3" creationId="{00000000-0000-0000-0000-000000000000}"/>
+            </ac:spMkLst>
+          </pc:spChg>
+          <pc:spChg chg="mod">
+            <ac:chgData name="Nikkel Mollenhauer" userId="c1ec013b5ec7a53d" providerId="LiveId" clId="{F6540EED-7EC4-4CE2-BCD2-8A52ACCFB0D8}" dt="2022-06-25T15:08:05.300" v="40"/>
+            <ac:spMkLst>
+              <pc:docMk/>
+              <pc:sldMasterMk cId="1562958951" sldId="2147483768"/>
+              <pc:sldLayoutMk cId="3291995468" sldId="2147483772"/>
+              <ac:spMk id="4" creationId="{00000000-0000-0000-0000-000000000000}"/>
+            </ac:spMkLst>
+          </pc:spChg>
+        </pc:sldLayoutChg>
+        <pc:sldLayoutChg chg="modSp">
+          <pc:chgData name="Nikkel Mollenhauer" userId="c1ec013b5ec7a53d" providerId="LiveId" clId="{F6540EED-7EC4-4CE2-BCD2-8A52ACCFB0D8}" dt="2022-06-25T15:08:05.300" v="40"/>
+          <pc:sldLayoutMkLst>
+            <pc:docMk/>
+            <pc:sldMasterMk cId="1562958951" sldId="2147483768"/>
+            <pc:sldLayoutMk cId="511040557" sldId="2147483773"/>
+          </pc:sldLayoutMkLst>
+          <pc:spChg chg="mod">
+            <ac:chgData name="Nikkel Mollenhauer" userId="c1ec013b5ec7a53d" providerId="LiveId" clId="{F6540EED-7EC4-4CE2-BCD2-8A52ACCFB0D8}" dt="2022-06-25T15:08:05.300" v="40"/>
+            <ac:spMkLst>
+              <pc:docMk/>
+              <pc:sldMasterMk cId="1562958951" sldId="2147483768"/>
+              <pc:sldLayoutMk cId="511040557" sldId="2147483773"/>
+              <ac:spMk id="2" creationId="{00000000-0000-0000-0000-000000000000}"/>
+            </ac:spMkLst>
+          </pc:spChg>
+          <pc:spChg chg="mod">
+            <ac:chgData name="Nikkel Mollenhauer" userId="c1ec013b5ec7a53d" providerId="LiveId" clId="{F6540EED-7EC4-4CE2-BCD2-8A52ACCFB0D8}" dt="2022-06-25T15:08:05.300" v="40"/>
+            <ac:spMkLst>
+              <pc:docMk/>
+              <pc:sldMasterMk cId="1562958951" sldId="2147483768"/>
+              <pc:sldLayoutMk cId="511040557" sldId="2147483773"/>
+              <ac:spMk id="3" creationId="{00000000-0000-0000-0000-000000000000}"/>
+            </ac:spMkLst>
+          </pc:spChg>
+          <pc:spChg chg="mod">
+            <ac:chgData name="Nikkel Mollenhauer" userId="c1ec013b5ec7a53d" providerId="LiveId" clId="{F6540EED-7EC4-4CE2-BCD2-8A52ACCFB0D8}" dt="2022-06-25T15:08:05.300" v="40"/>
+            <ac:spMkLst>
+              <pc:docMk/>
+              <pc:sldMasterMk cId="1562958951" sldId="2147483768"/>
+              <pc:sldLayoutMk cId="511040557" sldId="2147483773"/>
+              <ac:spMk id="4" creationId="{00000000-0000-0000-0000-000000000000}"/>
+            </ac:spMkLst>
+          </pc:spChg>
+          <pc:spChg chg="mod">
+            <ac:chgData name="Nikkel Mollenhauer" userId="c1ec013b5ec7a53d" providerId="LiveId" clId="{F6540EED-7EC4-4CE2-BCD2-8A52ACCFB0D8}" dt="2022-06-25T15:08:05.300" v="40"/>
+            <ac:spMkLst>
+              <pc:docMk/>
+              <pc:sldMasterMk cId="1562958951" sldId="2147483768"/>
+              <pc:sldLayoutMk cId="511040557" sldId="2147483773"/>
+              <ac:spMk id="5" creationId="{00000000-0000-0000-0000-000000000000}"/>
+            </ac:spMkLst>
+          </pc:spChg>
+          <pc:spChg chg="mod">
+            <ac:chgData name="Nikkel Mollenhauer" userId="c1ec013b5ec7a53d" providerId="LiveId" clId="{F6540EED-7EC4-4CE2-BCD2-8A52ACCFB0D8}" dt="2022-06-25T15:08:05.300" v="40"/>
+            <ac:spMkLst>
+              <pc:docMk/>
+              <pc:sldMasterMk cId="1562958951" sldId="2147483768"/>
+              <pc:sldLayoutMk cId="511040557" sldId="2147483773"/>
+              <ac:spMk id="6" creationId="{00000000-0000-0000-0000-000000000000}"/>
+            </ac:spMkLst>
+          </pc:spChg>
+        </pc:sldLayoutChg>
+        <pc:sldLayoutChg chg="modSp">
+          <pc:chgData name="Nikkel Mollenhauer" userId="c1ec013b5ec7a53d" providerId="LiveId" clId="{F6540EED-7EC4-4CE2-BCD2-8A52ACCFB0D8}" dt="2022-06-25T15:08:05.300" v="40"/>
+          <pc:sldLayoutMkLst>
+            <pc:docMk/>
+            <pc:sldMasterMk cId="1562958951" sldId="2147483768"/>
+            <pc:sldLayoutMk cId="1813252512" sldId="2147483776"/>
+          </pc:sldLayoutMkLst>
+          <pc:spChg chg="mod">
+            <ac:chgData name="Nikkel Mollenhauer" userId="c1ec013b5ec7a53d" providerId="LiveId" clId="{F6540EED-7EC4-4CE2-BCD2-8A52ACCFB0D8}" dt="2022-06-25T15:08:05.300" v="40"/>
+            <ac:spMkLst>
+              <pc:docMk/>
+              <pc:sldMasterMk cId="1562958951" sldId="2147483768"/>
+              <pc:sldLayoutMk cId="1813252512" sldId="2147483776"/>
+              <ac:spMk id="2" creationId="{00000000-0000-0000-0000-000000000000}"/>
+            </ac:spMkLst>
+          </pc:spChg>
+          <pc:spChg chg="mod">
+            <ac:chgData name="Nikkel Mollenhauer" userId="c1ec013b5ec7a53d" providerId="LiveId" clId="{F6540EED-7EC4-4CE2-BCD2-8A52ACCFB0D8}" dt="2022-06-25T15:08:05.300" v="40"/>
+            <ac:spMkLst>
+              <pc:docMk/>
+              <pc:sldMasterMk cId="1562958951" sldId="2147483768"/>
+              <pc:sldLayoutMk cId="1813252512" sldId="2147483776"/>
+              <ac:spMk id="3" creationId="{00000000-0000-0000-0000-000000000000}"/>
+            </ac:spMkLst>
+          </pc:spChg>
+          <pc:spChg chg="mod">
+            <ac:chgData name="Nikkel Mollenhauer" userId="c1ec013b5ec7a53d" providerId="LiveId" clId="{F6540EED-7EC4-4CE2-BCD2-8A52ACCFB0D8}" dt="2022-06-25T15:08:05.300" v="40"/>
+            <ac:spMkLst>
+              <pc:docMk/>
+              <pc:sldMasterMk cId="1562958951" sldId="2147483768"/>
+              <pc:sldLayoutMk cId="1813252512" sldId="2147483776"/>
+              <ac:spMk id="4" creationId="{00000000-0000-0000-0000-000000000000}"/>
+            </ac:spMkLst>
+          </pc:spChg>
+        </pc:sldLayoutChg>
+        <pc:sldLayoutChg chg="modSp">
+          <pc:chgData name="Nikkel Mollenhauer" userId="c1ec013b5ec7a53d" providerId="LiveId" clId="{F6540EED-7EC4-4CE2-BCD2-8A52ACCFB0D8}" dt="2022-06-25T15:08:05.300" v="40"/>
+          <pc:sldLayoutMkLst>
+            <pc:docMk/>
+            <pc:sldMasterMk cId="1562958951" sldId="2147483768"/>
+            <pc:sldLayoutMk cId="1906608289" sldId="2147483777"/>
+          </pc:sldLayoutMkLst>
+          <pc:spChg chg="mod">
+            <ac:chgData name="Nikkel Mollenhauer" userId="c1ec013b5ec7a53d" providerId="LiveId" clId="{F6540EED-7EC4-4CE2-BCD2-8A52ACCFB0D8}" dt="2022-06-25T15:08:05.300" v="40"/>
+            <ac:spMkLst>
+              <pc:docMk/>
+              <pc:sldMasterMk cId="1562958951" sldId="2147483768"/>
+              <pc:sldLayoutMk cId="1906608289" sldId="2147483777"/>
+              <ac:spMk id="2" creationId="{00000000-0000-0000-0000-000000000000}"/>
+            </ac:spMkLst>
+          </pc:spChg>
+          <pc:spChg chg="mod">
+            <ac:chgData name="Nikkel Mollenhauer" userId="c1ec013b5ec7a53d" providerId="LiveId" clId="{F6540EED-7EC4-4CE2-BCD2-8A52ACCFB0D8}" dt="2022-06-25T15:08:05.300" v="40"/>
+            <ac:spMkLst>
+              <pc:docMk/>
+              <pc:sldMasterMk cId="1562958951" sldId="2147483768"/>
+              <pc:sldLayoutMk cId="1906608289" sldId="2147483777"/>
+              <ac:spMk id="3" creationId="{00000000-0000-0000-0000-000000000000}"/>
+            </ac:spMkLst>
+          </pc:spChg>
+          <pc:spChg chg="mod">
+            <ac:chgData name="Nikkel Mollenhauer" userId="c1ec013b5ec7a53d" providerId="LiveId" clId="{F6540EED-7EC4-4CE2-BCD2-8A52ACCFB0D8}" dt="2022-06-25T15:08:05.300" v="40"/>
+            <ac:spMkLst>
+              <pc:docMk/>
+              <pc:sldMasterMk cId="1562958951" sldId="2147483768"/>
+              <pc:sldLayoutMk cId="1906608289" sldId="2147483777"/>
+              <ac:spMk id="4" creationId="{00000000-0000-0000-0000-000000000000}"/>
+            </ac:spMkLst>
+          </pc:spChg>
+        </pc:sldLayoutChg>
+        <pc:sldLayoutChg chg="modSp">
+          <pc:chgData name="Nikkel Mollenhauer" userId="c1ec013b5ec7a53d" providerId="LiveId" clId="{F6540EED-7EC4-4CE2-BCD2-8A52ACCFB0D8}" dt="2022-06-25T15:08:05.300" v="40"/>
+          <pc:sldLayoutMkLst>
+            <pc:docMk/>
+            <pc:sldMasterMk cId="1562958951" sldId="2147483768"/>
+            <pc:sldLayoutMk cId="1065100660" sldId="2147483779"/>
+          </pc:sldLayoutMkLst>
+          <pc:spChg chg="mod">
+            <ac:chgData name="Nikkel Mollenhauer" userId="c1ec013b5ec7a53d" providerId="LiveId" clId="{F6540EED-7EC4-4CE2-BCD2-8A52ACCFB0D8}" dt="2022-06-25T15:08:05.300" v="40"/>
+            <ac:spMkLst>
+              <pc:docMk/>
+              <pc:sldMasterMk cId="1562958951" sldId="2147483768"/>
+              <pc:sldLayoutMk cId="1065100660" sldId="2147483779"/>
+              <ac:spMk id="2" creationId="{00000000-0000-0000-0000-000000000000}"/>
+            </ac:spMkLst>
+          </pc:spChg>
+          <pc:spChg chg="mod">
+            <ac:chgData name="Nikkel Mollenhauer" userId="c1ec013b5ec7a53d" providerId="LiveId" clId="{F6540EED-7EC4-4CE2-BCD2-8A52ACCFB0D8}" dt="2022-06-25T15:08:05.300" v="40"/>
+            <ac:spMkLst>
+              <pc:docMk/>
+              <pc:sldMasterMk cId="1562958951" sldId="2147483768"/>
+              <pc:sldLayoutMk cId="1065100660" sldId="2147483779"/>
+              <ac:spMk id="3" creationId="{00000000-0000-0000-0000-000000000000}"/>
+            </ac:spMkLst>
+          </pc:spChg>
+        </pc:sldLayoutChg>
+      </pc:sldMasterChg>
     </pc:docChg>
   </pc:docChgLst>
 </pc:chgInfo>
@@ -210,7 +492,7 @@
         </p:nvSpPr>
         <p:spPr>
           <a:xfrm>
-            <a:off x="486013" y="765909"/>
+            <a:off x="486017" y="765909"/>
             <a:ext cx="5508149" cy="1629316"/>
           </a:xfrm>
         </p:spPr>
@@ -242,7 +524,7 @@
         </p:nvSpPr>
         <p:spPr>
           <a:xfrm>
-            <a:off x="810022" y="2458058"/>
+            <a:off x="810026" y="2458058"/>
             <a:ext cx="4860131" cy="1129904"/>
           </a:xfrm>
         </p:spPr>
@@ -253,35 +535,35 @@
               <a:buNone/>
               <a:defRPr sz="1638"/>
             </a:lvl1pPr>
-            <a:lvl2pPr marL="311993" indent="0" algn="ctr">
+            <a:lvl2pPr marL="311970" indent="0" algn="ctr">
               <a:buNone/>
               <a:defRPr sz="1365"/>
             </a:lvl2pPr>
-            <a:lvl3pPr marL="623987" indent="0" algn="ctr">
+            <a:lvl3pPr marL="623941" indent="0" algn="ctr">
               <a:buNone/>
               <a:defRPr sz="1228"/>
             </a:lvl3pPr>
-            <a:lvl4pPr marL="935980" indent="0" algn="ctr">
+            <a:lvl4pPr marL="935911" indent="0" algn="ctr">
               <a:buNone/>
               <a:defRPr sz="1092"/>
             </a:lvl4pPr>
-            <a:lvl5pPr marL="1247973" indent="0" algn="ctr">
+            <a:lvl5pPr marL="1247881" indent="0" algn="ctr">
               <a:buNone/>
               <a:defRPr sz="1092"/>
             </a:lvl5pPr>
-            <a:lvl6pPr marL="1559966" indent="0" algn="ctr">
+            <a:lvl6pPr marL="1559851" indent="0" algn="ctr">
               <a:buNone/>
               <a:defRPr sz="1092"/>
             </a:lvl6pPr>
-            <a:lvl7pPr marL="1871960" indent="0" algn="ctr">
+            <a:lvl7pPr marL="1871822" indent="0" algn="ctr">
               <a:buNone/>
               <a:defRPr sz="1092"/>
             </a:lvl7pPr>
-            <a:lvl8pPr marL="2183953" indent="0" algn="ctr">
+            <a:lvl8pPr marL="2183792" indent="0" algn="ctr">
               <a:buNone/>
               <a:defRPr sz="1092"/>
             </a:lvl8pPr>
-            <a:lvl9pPr marL="2495946" indent="0" algn="ctr">
+            <a:lvl9pPr marL="2495763" indent="0" algn="ctr">
               <a:buNone/>
               <a:defRPr sz="1092"/>
             </a:lvl9pPr>
@@ -312,7 +594,7 @@
           <a:p>
             <a:fld id="{8557B4ED-93EE-46C5-9353-58A17C588CE7}" type="datetimeFigureOut">
               <a:rPr lang="en-GB" smtClean="0"/>
-              <a:t>23/06/22</a:t>
+              <a:t>25/06/22</a:t>
             </a:fld>
             <a:endParaRPr lang="en-GB"/>
           </a:p>
@@ -482,7 +764,7 @@
           <a:p>
             <a:fld id="{8557B4ED-93EE-46C5-9353-58A17C588CE7}" type="datetimeFigureOut">
               <a:rPr lang="en-GB" smtClean="0"/>
-              <a:t>23/06/22</a:t>
+              <a:t>25/06/22</a:t>
             </a:fld>
             <a:endParaRPr lang="en-GB"/>
           </a:p>
@@ -572,7 +854,7 @@
         </p:nvSpPr>
         <p:spPr>
           <a:xfrm>
-            <a:off x="4637375" y="249164"/>
+            <a:off x="4637375" y="249166"/>
             <a:ext cx="1397288" cy="3966041"/>
           </a:xfrm>
         </p:spPr>
@@ -600,7 +882,7 @@
         </p:nvSpPr>
         <p:spPr>
           <a:xfrm>
-            <a:off x="445512" y="249164"/>
+            <a:off x="445516" y="249166"/>
             <a:ext cx="4110861" cy="3966041"/>
           </a:xfrm>
         </p:spPr>
@@ -662,7 +944,7 @@
           <a:p>
             <a:fld id="{8557B4ED-93EE-46C5-9353-58A17C588CE7}" type="datetimeFigureOut">
               <a:rPr lang="en-GB" smtClean="0"/>
-              <a:t>23/06/22</a:t>
+              <a:t>25/06/22</a:t>
             </a:fld>
             <a:endParaRPr lang="en-GB"/>
           </a:p>
@@ -832,7 +1114,7 @@
           <a:p>
             <a:fld id="{8557B4ED-93EE-46C5-9353-58A17C588CE7}" type="datetimeFigureOut">
               <a:rPr lang="en-GB" smtClean="0"/>
-              <a:t>23/06/22</a:t>
+              <a:t>25/06/22</a:t>
             </a:fld>
             <a:endParaRPr lang="en-GB"/>
           </a:p>
@@ -922,7 +1204,7 @@
         </p:nvSpPr>
         <p:spPr>
           <a:xfrm>
-            <a:off x="442137" y="1166739"/>
+            <a:off x="442141" y="1166741"/>
             <a:ext cx="5589151" cy="1946729"/>
           </a:xfrm>
         </p:spPr>
@@ -954,7 +1236,7 @@
         </p:nvSpPr>
         <p:spPr>
           <a:xfrm>
-            <a:off x="442137" y="3131884"/>
+            <a:off x="442141" y="3131884"/>
             <a:ext cx="5589151" cy="1023739"/>
           </a:xfrm>
         </p:spPr>
@@ -969,7 +1251,7 @@
                 </a:solidFill>
               </a:defRPr>
             </a:lvl1pPr>
-            <a:lvl2pPr marL="311993" indent="0">
+            <a:lvl2pPr marL="311970" indent="0">
               <a:buNone/>
               <a:defRPr sz="1365">
                 <a:solidFill>
@@ -979,7 +1261,7 @@
                 </a:solidFill>
               </a:defRPr>
             </a:lvl2pPr>
-            <a:lvl3pPr marL="623987" indent="0">
+            <a:lvl3pPr marL="623941" indent="0">
               <a:buNone/>
               <a:defRPr sz="1228">
                 <a:solidFill>
@@ -989,7 +1271,7 @@
                 </a:solidFill>
               </a:defRPr>
             </a:lvl3pPr>
-            <a:lvl4pPr marL="935980" indent="0">
+            <a:lvl4pPr marL="935911" indent="0">
               <a:buNone/>
               <a:defRPr sz="1092">
                 <a:solidFill>
@@ -999,7 +1281,7 @@
                 </a:solidFill>
               </a:defRPr>
             </a:lvl4pPr>
-            <a:lvl5pPr marL="1247973" indent="0">
+            <a:lvl5pPr marL="1247881" indent="0">
               <a:buNone/>
               <a:defRPr sz="1092">
                 <a:solidFill>
@@ -1009,7 +1291,7 @@
                 </a:solidFill>
               </a:defRPr>
             </a:lvl5pPr>
-            <a:lvl6pPr marL="1559966" indent="0">
+            <a:lvl6pPr marL="1559851" indent="0">
               <a:buNone/>
               <a:defRPr sz="1092">
                 <a:solidFill>
@@ -1019,7 +1301,7 @@
                 </a:solidFill>
               </a:defRPr>
             </a:lvl6pPr>
-            <a:lvl7pPr marL="1871960" indent="0">
+            <a:lvl7pPr marL="1871822" indent="0">
               <a:buNone/>
               <a:defRPr sz="1092">
                 <a:solidFill>
@@ -1029,7 +1311,7 @@
                 </a:solidFill>
               </a:defRPr>
             </a:lvl7pPr>
-            <a:lvl8pPr marL="2183953" indent="0">
+            <a:lvl8pPr marL="2183792" indent="0">
               <a:buNone/>
               <a:defRPr sz="1092">
                 <a:solidFill>
@@ -1039,7 +1321,7 @@
                 </a:solidFill>
               </a:defRPr>
             </a:lvl8pPr>
-            <a:lvl9pPr marL="2495946" indent="0">
+            <a:lvl9pPr marL="2495763" indent="0">
               <a:buNone/>
               <a:defRPr sz="1092">
                 <a:solidFill>
@@ -1076,7 +1358,7 @@
           <a:p>
             <a:fld id="{8557B4ED-93EE-46C5-9353-58A17C588CE7}" type="datetimeFigureOut">
               <a:rPr lang="en-GB" smtClean="0"/>
-              <a:t>23/06/22</a:t>
+              <a:t>25/06/22</a:t>
             </a:fld>
             <a:endParaRPr lang="en-GB"/>
           </a:p>
@@ -1189,7 +1471,7 @@
         </p:nvSpPr>
         <p:spPr>
           <a:xfrm>
-            <a:off x="445512" y="1245820"/>
+            <a:off x="445512" y="1245821"/>
             <a:ext cx="2754074" cy="2969385"/>
           </a:xfrm>
         </p:spPr>
@@ -1246,7 +1528,7 @@
         </p:nvSpPr>
         <p:spPr>
           <a:xfrm>
-            <a:off x="3280589" y="1245820"/>
+            <a:off x="3280589" y="1245821"/>
             <a:ext cx="2754074" cy="2969385"/>
           </a:xfrm>
         </p:spPr>
@@ -1308,7 +1590,7 @@
           <a:p>
             <a:fld id="{8557B4ED-93EE-46C5-9353-58A17C588CE7}" type="datetimeFigureOut">
               <a:rPr lang="en-GB" smtClean="0"/>
-              <a:t>23/06/22</a:t>
+              <a:t>25/06/22</a:t>
             </a:fld>
             <a:endParaRPr lang="en-GB"/>
           </a:p>
@@ -1398,7 +1680,7 @@
         </p:nvSpPr>
         <p:spPr>
           <a:xfrm>
-            <a:off x="446356" y="249165"/>
+            <a:off x="446358" y="249165"/>
             <a:ext cx="5589151" cy="904574"/>
           </a:xfrm>
         </p:spPr>
@@ -1426,7 +1708,7 @@
         </p:nvSpPr>
         <p:spPr>
           <a:xfrm>
-            <a:off x="446357" y="1147238"/>
+            <a:off x="446361" y="1147238"/>
             <a:ext cx="2741417" cy="562244"/>
           </a:xfrm>
         </p:spPr>
@@ -1437,35 +1719,35 @@
               <a:buNone/>
               <a:defRPr sz="1638" b="1"/>
             </a:lvl1pPr>
-            <a:lvl2pPr marL="311993" indent="0">
+            <a:lvl2pPr marL="311970" indent="0">
               <a:buNone/>
               <a:defRPr sz="1365" b="1"/>
             </a:lvl2pPr>
-            <a:lvl3pPr marL="623987" indent="0">
+            <a:lvl3pPr marL="623941" indent="0">
               <a:buNone/>
               <a:defRPr sz="1228" b="1"/>
             </a:lvl3pPr>
-            <a:lvl4pPr marL="935980" indent="0">
+            <a:lvl4pPr marL="935911" indent="0">
               <a:buNone/>
               <a:defRPr sz="1092" b="1"/>
             </a:lvl4pPr>
-            <a:lvl5pPr marL="1247973" indent="0">
+            <a:lvl5pPr marL="1247881" indent="0">
               <a:buNone/>
               <a:defRPr sz="1092" b="1"/>
             </a:lvl5pPr>
-            <a:lvl6pPr marL="1559966" indent="0">
+            <a:lvl6pPr marL="1559851" indent="0">
               <a:buNone/>
               <a:defRPr sz="1092" b="1"/>
             </a:lvl6pPr>
-            <a:lvl7pPr marL="1871960" indent="0">
+            <a:lvl7pPr marL="1871822" indent="0">
               <a:buNone/>
               <a:defRPr sz="1092" b="1"/>
             </a:lvl7pPr>
-            <a:lvl8pPr marL="2183953" indent="0">
+            <a:lvl8pPr marL="2183792" indent="0">
               <a:buNone/>
               <a:defRPr sz="1092" b="1"/>
             </a:lvl8pPr>
-            <a:lvl9pPr marL="2495946" indent="0">
+            <a:lvl9pPr marL="2495763" indent="0">
               <a:buNone/>
               <a:defRPr sz="1092" b="1"/>
             </a:lvl9pPr>
@@ -1491,7 +1773,7 @@
         </p:nvSpPr>
         <p:spPr>
           <a:xfrm>
-            <a:off x="446357" y="1709482"/>
+            <a:off x="446361" y="1709482"/>
             <a:ext cx="2741417" cy="2514390"/>
           </a:xfrm>
         </p:spPr>
@@ -1559,35 +1841,35 @@
               <a:buNone/>
               <a:defRPr sz="1638" b="1"/>
             </a:lvl1pPr>
-            <a:lvl2pPr marL="311993" indent="0">
+            <a:lvl2pPr marL="311970" indent="0">
               <a:buNone/>
               <a:defRPr sz="1365" b="1"/>
             </a:lvl2pPr>
-            <a:lvl3pPr marL="623987" indent="0">
+            <a:lvl3pPr marL="623941" indent="0">
               <a:buNone/>
               <a:defRPr sz="1228" b="1"/>
             </a:lvl3pPr>
-            <a:lvl4pPr marL="935980" indent="0">
+            <a:lvl4pPr marL="935911" indent="0">
               <a:buNone/>
               <a:defRPr sz="1092" b="1"/>
             </a:lvl4pPr>
-            <a:lvl5pPr marL="1247973" indent="0">
+            <a:lvl5pPr marL="1247881" indent="0">
               <a:buNone/>
               <a:defRPr sz="1092" b="1"/>
             </a:lvl5pPr>
-            <a:lvl6pPr marL="1559966" indent="0">
+            <a:lvl6pPr marL="1559851" indent="0">
               <a:buNone/>
               <a:defRPr sz="1092" b="1"/>
             </a:lvl6pPr>
-            <a:lvl7pPr marL="1871960" indent="0">
+            <a:lvl7pPr marL="1871822" indent="0">
               <a:buNone/>
               <a:defRPr sz="1092" b="1"/>
             </a:lvl7pPr>
-            <a:lvl8pPr marL="2183953" indent="0">
+            <a:lvl8pPr marL="2183792" indent="0">
               <a:buNone/>
               <a:defRPr sz="1092" b="1"/>
             </a:lvl8pPr>
-            <a:lvl9pPr marL="2495946" indent="0">
+            <a:lvl9pPr marL="2495763" indent="0">
               <a:buNone/>
               <a:defRPr sz="1092" b="1"/>
             </a:lvl9pPr>
@@ -1675,7 +1957,7 @@
           <a:p>
             <a:fld id="{8557B4ED-93EE-46C5-9353-58A17C588CE7}" type="datetimeFigureOut">
               <a:rPr lang="en-GB" smtClean="0"/>
-              <a:t>23/06/22</a:t>
+              <a:t>25/06/22</a:t>
             </a:fld>
             <a:endParaRPr lang="en-GB"/>
           </a:p>
@@ -1793,7 +2075,7 @@
           <a:p>
             <a:fld id="{8557B4ED-93EE-46C5-9353-58A17C588CE7}" type="datetimeFigureOut">
               <a:rPr lang="en-GB" smtClean="0"/>
-              <a:t>23/06/22</a:t>
+              <a:t>25/06/22</a:t>
             </a:fld>
             <a:endParaRPr lang="en-GB"/>
           </a:p>
@@ -1888,7 +2170,7 @@
           <a:p>
             <a:fld id="{8557B4ED-93EE-46C5-9353-58A17C588CE7}" type="datetimeFigureOut">
               <a:rPr lang="en-GB" smtClean="0"/>
-              <a:t>23/06/22</a:t>
+              <a:t>25/06/22</a:t>
             </a:fld>
             <a:endParaRPr lang="en-GB"/>
           </a:p>
@@ -1978,7 +2260,7 @@
         </p:nvSpPr>
         <p:spPr>
           <a:xfrm>
-            <a:off x="446356" y="311997"/>
+            <a:off x="446360" y="311997"/>
             <a:ext cx="2090025" cy="1091988"/>
           </a:xfrm>
         </p:spPr>
@@ -2010,7 +2292,7 @@
         </p:nvSpPr>
         <p:spPr>
           <a:xfrm>
-            <a:off x="2754918" y="673827"/>
+            <a:off x="2754922" y="673827"/>
             <a:ext cx="3280589" cy="3325798"/>
           </a:xfrm>
         </p:spPr>
@@ -2095,7 +2377,7 @@
         </p:nvSpPr>
         <p:spPr>
           <a:xfrm>
-            <a:off x="446356" y="1403985"/>
+            <a:off x="446360" y="1403985"/>
             <a:ext cx="2090025" cy="2601056"/>
           </a:xfrm>
         </p:spPr>
@@ -2106,35 +2388,35 @@
               <a:buNone/>
               <a:defRPr sz="1092"/>
             </a:lvl1pPr>
-            <a:lvl2pPr marL="311993" indent="0">
+            <a:lvl2pPr marL="311970" indent="0">
               <a:buNone/>
               <a:defRPr sz="955"/>
             </a:lvl2pPr>
-            <a:lvl3pPr marL="623987" indent="0">
+            <a:lvl3pPr marL="623941" indent="0">
               <a:buNone/>
               <a:defRPr sz="819"/>
             </a:lvl3pPr>
-            <a:lvl4pPr marL="935980" indent="0">
+            <a:lvl4pPr marL="935911" indent="0">
               <a:buNone/>
               <a:defRPr sz="682"/>
             </a:lvl4pPr>
-            <a:lvl5pPr marL="1247973" indent="0">
+            <a:lvl5pPr marL="1247881" indent="0">
               <a:buNone/>
               <a:defRPr sz="682"/>
             </a:lvl5pPr>
-            <a:lvl6pPr marL="1559966" indent="0">
+            <a:lvl6pPr marL="1559851" indent="0">
               <a:buNone/>
               <a:defRPr sz="682"/>
             </a:lvl6pPr>
-            <a:lvl7pPr marL="1871960" indent="0">
+            <a:lvl7pPr marL="1871822" indent="0">
               <a:buNone/>
               <a:defRPr sz="682"/>
             </a:lvl7pPr>
-            <a:lvl8pPr marL="2183953" indent="0">
+            <a:lvl8pPr marL="2183792" indent="0">
               <a:buNone/>
               <a:defRPr sz="682"/>
             </a:lvl8pPr>
-            <a:lvl9pPr marL="2495946" indent="0">
+            <a:lvl9pPr marL="2495763" indent="0">
               <a:buNone/>
               <a:defRPr sz="682"/>
             </a:lvl9pPr>
@@ -2165,7 +2447,7 @@
           <a:p>
             <a:fld id="{8557B4ED-93EE-46C5-9353-58A17C588CE7}" type="datetimeFigureOut">
               <a:rPr lang="en-GB" smtClean="0"/>
-              <a:t>23/06/22</a:t>
+              <a:t>25/06/22</a:t>
             </a:fld>
             <a:endParaRPr lang="en-GB"/>
           </a:p>
@@ -2255,7 +2537,7 @@
         </p:nvSpPr>
         <p:spPr>
           <a:xfrm>
-            <a:off x="446356" y="311997"/>
+            <a:off x="446360" y="311997"/>
             <a:ext cx="2090025" cy="1091988"/>
           </a:xfrm>
         </p:spPr>
@@ -2287,7 +2569,7 @@
         </p:nvSpPr>
         <p:spPr>
           <a:xfrm>
-            <a:off x="2754918" y="673827"/>
+            <a:off x="2754922" y="673827"/>
             <a:ext cx="3280589" cy="3325798"/>
           </a:xfrm>
         </p:spPr>
@@ -2298,35 +2580,35 @@
               <a:buNone/>
               <a:defRPr sz="2184"/>
             </a:lvl1pPr>
-            <a:lvl2pPr marL="311993" indent="0">
+            <a:lvl2pPr marL="311970" indent="0">
               <a:buNone/>
               <a:defRPr sz="1911"/>
             </a:lvl2pPr>
-            <a:lvl3pPr marL="623987" indent="0">
+            <a:lvl3pPr marL="623941" indent="0">
               <a:buNone/>
               <a:defRPr sz="1638"/>
             </a:lvl3pPr>
-            <a:lvl4pPr marL="935980" indent="0">
+            <a:lvl4pPr marL="935911" indent="0">
               <a:buNone/>
               <a:defRPr sz="1365"/>
             </a:lvl4pPr>
-            <a:lvl5pPr marL="1247973" indent="0">
+            <a:lvl5pPr marL="1247881" indent="0">
               <a:buNone/>
               <a:defRPr sz="1365"/>
             </a:lvl5pPr>
-            <a:lvl6pPr marL="1559966" indent="0">
+            <a:lvl6pPr marL="1559851" indent="0">
               <a:buNone/>
               <a:defRPr sz="1365"/>
             </a:lvl6pPr>
-            <a:lvl7pPr marL="1871960" indent="0">
+            <a:lvl7pPr marL="1871822" indent="0">
               <a:buNone/>
               <a:defRPr sz="1365"/>
             </a:lvl7pPr>
-            <a:lvl8pPr marL="2183953" indent="0">
+            <a:lvl8pPr marL="2183792" indent="0">
               <a:buNone/>
               <a:defRPr sz="1365"/>
             </a:lvl8pPr>
-            <a:lvl9pPr marL="2495946" indent="0">
+            <a:lvl9pPr marL="2495763" indent="0">
               <a:buNone/>
               <a:defRPr sz="1365"/>
             </a:lvl9pPr>
@@ -2352,7 +2634,7 @@
         </p:nvSpPr>
         <p:spPr>
           <a:xfrm>
-            <a:off x="446356" y="1403985"/>
+            <a:off x="446360" y="1403985"/>
             <a:ext cx="2090025" cy="2601056"/>
           </a:xfrm>
         </p:spPr>
@@ -2363,35 +2645,35 @@
               <a:buNone/>
               <a:defRPr sz="1092"/>
             </a:lvl1pPr>
-            <a:lvl2pPr marL="311993" indent="0">
+            <a:lvl2pPr marL="311970" indent="0">
               <a:buNone/>
               <a:defRPr sz="955"/>
             </a:lvl2pPr>
-            <a:lvl3pPr marL="623987" indent="0">
+            <a:lvl3pPr marL="623941" indent="0">
               <a:buNone/>
               <a:defRPr sz="819"/>
             </a:lvl3pPr>
-            <a:lvl4pPr marL="935980" indent="0">
+            <a:lvl4pPr marL="935911" indent="0">
               <a:buNone/>
               <a:defRPr sz="682"/>
             </a:lvl4pPr>
-            <a:lvl5pPr marL="1247973" indent="0">
+            <a:lvl5pPr marL="1247881" indent="0">
               <a:buNone/>
               <a:defRPr sz="682"/>
             </a:lvl5pPr>
-            <a:lvl6pPr marL="1559966" indent="0">
+            <a:lvl6pPr marL="1559851" indent="0">
               <a:buNone/>
               <a:defRPr sz="682"/>
             </a:lvl6pPr>
-            <a:lvl7pPr marL="1871960" indent="0">
+            <a:lvl7pPr marL="1871822" indent="0">
               <a:buNone/>
               <a:defRPr sz="682"/>
             </a:lvl7pPr>
-            <a:lvl8pPr marL="2183953" indent="0">
+            <a:lvl8pPr marL="2183792" indent="0">
               <a:buNone/>
               <a:defRPr sz="682"/>
             </a:lvl8pPr>
-            <a:lvl9pPr marL="2495946" indent="0">
+            <a:lvl9pPr marL="2495763" indent="0">
               <a:buNone/>
               <a:defRPr sz="682"/>
             </a:lvl9pPr>
@@ -2422,7 +2704,7 @@
           <a:p>
             <a:fld id="{8557B4ED-93EE-46C5-9353-58A17C588CE7}" type="datetimeFigureOut">
               <a:rPr lang="en-GB" smtClean="0"/>
-              <a:t>23/06/22</a:t>
+              <a:t>25/06/22</a:t>
             </a:fld>
             <a:endParaRPr lang="en-GB"/>
           </a:p>
@@ -2517,7 +2799,7 @@
         </p:nvSpPr>
         <p:spPr>
           <a:xfrm>
-            <a:off x="445512" y="249165"/>
+            <a:off x="445516" y="249165"/>
             <a:ext cx="5589151" cy="904574"/>
           </a:xfrm>
           <a:prstGeom prst="rect">
@@ -2550,7 +2832,7 @@
         </p:nvSpPr>
         <p:spPr>
           <a:xfrm>
-            <a:off x="445512" y="1245820"/>
+            <a:off x="445516" y="1245821"/>
             <a:ext cx="5589151" cy="2969385"/>
           </a:xfrm>
           <a:prstGeom prst="rect">
@@ -2612,7 +2894,7 @@
         </p:nvSpPr>
         <p:spPr>
           <a:xfrm>
-            <a:off x="445512" y="4337621"/>
+            <a:off x="445516" y="4337621"/>
             <a:ext cx="1458039" cy="249164"/>
           </a:xfrm>
           <a:prstGeom prst="rect">
@@ -2635,7 +2917,7 @@
           <a:p>
             <a:fld id="{8557B4ED-93EE-46C5-9353-58A17C588CE7}" type="datetimeFigureOut">
               <a:rPr lang="en-GB" smtClean="0"/>
-              <a:t>23/06/22</a:t>
+              <a:t>25/06/22</a:t>
             </a:fld>
             <a:endParaRPr lang="en-GB"/>
           </a:p>
@@ -2653,7 +2935,7 @@
         </p:nvSpPr>
         <p:spPr>
           <a:xfrm>
-            <a:off x="2146558" y="4337621"/>
+            <a:off x="2146562" y="4337621"/>
             <a:ext cx="2187059" cy="249164"/>
           </a:xfrm>
           <a:prstGeom prst="rect">
@@ -2690,7 +2972,7 @@
         </p:nvSpPr>
         <p:spPr>
           <a:xfrm>
-            <a:off x="4576624" y="4337621"/>
+            <a:off x="4576628" y="4337621"/>
             <a:ext cx="1458039" cy="249164"/>
           </a:xfrm>
           <a:prstGeom prst="rect">
@@ -2742,7 +3024,7 @@
   </p:sldLayoutIdLst>
   <p:txStyles>
     <p:titleStyle>
-      <a:lvl1pPr algn="l" defTabSz="623987" rtl="0" eaLnBrk="1" latinLnBrk="0" hangingPunct="1">
+      <a:lvl1pPr algn="l" defTabSz="623941" rtl="0" eaLnBrk="1" latinLnBrk="0" hangingPunct="1">
         <a:lnSpc>
           <a:spcPct val="90000"/>
         </a:lnSpc>
@@ -2761,7 +3043,7 @@
       </a:lvl1pPr>
     </p:titleStyle>
     <p:bodyStyle>
-      <a:lvl1pPr marL="155997" indent="-155997" algn="l" defTabSz="623987" rtl="0" eaLnBrk="1" latinLnBrk="0" hangingPunct="1">
+      <a:lvl1pPr marL="155985" indent="-155985" algn="l" defTabSz="623941" rtl="0" eaLnBrk="1" latinLnBrk="0" hangingPunct="1">
         <a:lnSpc>
           <a:spcPct val="90000"/>
         </a:lnSpc>
@@ -2779,7 +3061,7 @@
           <a:cs typeface="+mn-cs"/>
         </a:defRPr>
       </a:lvl1pPr>
-      <a:lvl2pPr marL="467990" indent="-155997" algn="l" defTabSz="623987" rtl="0" eaLnBrk="1" latinLnBrk="0" hangingPunct="1">
+      <a:lvl2pPr marL="467956" indent="-155985" algn="l" defTabSz="623941" rtl="0" eaLnBrk="1" latinLnBrk="0" hangingPunct="1">
         <a:lnSpc>
           <a:spcPct val="90000"/>
         </a:lnSpc>
@@ -2797,7 +3079,7 @@
           <a:cs typeface="+mn-cs"/>
         </a:defRPr>
       </a:lvl2pPr>
-      <a:lvl3pPr marL="779983" indent="-155997" algn="l" defTabSz="623987" rtl="0" eaLnBrk="1" latinLnBrk="0" hangingPunct="1">
+      <a:lvl3pPr marL="779926" indent="-155985" algn="l" defTabSz="623941" rtl="0" eaLnBrk="1" latinLnBrk="0" hangingPunct="1">
         <a:lnSpc>
           <a:spcPct val="90000"/>
         </a:lnSpc>
@@ -2815,7 +3097,7 @@
           <a:cs typeface="+mn-cs"/>
         </a:defRPr>
       </a:lvl3pPr>
-      <a:lvl4pPr marL="1091976" indent="-155997" algn="l" defTabSz="623987" rtl="0" eaLnBrk="1" latinLnBrk="0" hangingPunct="1">
+      <a:lvl4pPr marL="1091896" indent="-155985" algn="l" defTabSz="623941" rtl="0" eaLnBrk="1" latinLnBrk="0" hangingPunct="1">
         <a:lnSpc>
           <a:spcPct val="90000"/>
         </a:lnSpc>
@@ -2833,7 +3115,7 @@
           <a:cs typeface="+mn-cs"/>
         </a:defRPr>
       </a:lvl4pPr>
-      <a:lvl5pPr marL="1403970" indent="-155997" algn="l" defTabSz="623987" rtl="0" eaLnBrk="1" latinLnBrk="0" hangingPunct="1">
+      <a:lvl5pPr marL="1403867" indent="-155985" algn="l" defTabSz="623941" rtl="0" eaLnBrk="1" latinLnBrk="0" hangingPunct="1">
         <a:lnSpc>
           <a:spcPct val="90000"/>
         </a:lnSpc>
@@ -2851,7 +3133,7 @@
           <a:cs typeface="+mn-cs"/>
         </a:defRPr>
       </a:lvl5pPr>
-      <a:lvl6pPr marL="1715963" indent="-155997" algn="l" defTabSz="623987" rtl="0" eaLnBrk="1" latinLnBrk="0" hangingPunct="1">
+      <a:lvl6pPr marL="1715837" indent="-155985" algn="l" defTabSz="623941" rtl="0" eaLnBrk="1" latinLnBrk="0" hangingPunct="1">
         <a:lnSpc>
           <a:spcPct val="90000"/>
         </a:lnSpc>
@@ -2869,7 +3151,7 @@
           <a:cs typeface="+mn-cs"/>
         </a:defRPr>
       </a:lvl6pPr>
-      <a:lvl7pPr marL="2027956" indent="-155997" algn="l" defTabSz="623987" rtl="0" eaLnBrk="1" latinLnBrk="0" hangingPunct="1">
+      <a:lvl7pPr marL="2027807" indent="-155985" algn="l" defTabSz="623941" rtl="0" eaLnBrk="1" latinLnBrk="0" hangingPunct="1">
         <a:lnSpc>
           <a:spcPct val="90000"/>
         </a:lnSpc>
@@ -2887,7 +3169,7 @@
           <a:cs typeface="+mn-cs"/>
         </a:defRPr>
       </a:lvl7pPr>
-      <a:lvl8pPr marL="2339950" indent="-155997" algn="l" defTabSz="623987" rtl="0" eaLnBrk="1" latinLnBrk="0" hangingPunct="1">
+      <a:lvl8pPr marL="2339778" indent="-155985" algn="l" defTabSz="623941" rtl="0" eaLnBrk="1" latinLnBrk="0" hangingPunct="1">
         <a:lnSpc>
           <a:spcPct val="90000"/>
         </a:lnSpc>
@@ -2905,7 +3187,7 @@
           <a:cs typeface="+mn-cs"/>
         </a:defRPr>
       </a:lvl8pPr>
-      <a:lvl9pPr marL="2651943" indent="-155997" algn="l" defTabSz="623987" rtl="0" eaLnBrk="1" latinLnBrk="0" hangingPunct="1">
+      <a:lvl9pPr marL="2651748" indent="-155985" algn="l" defTabSz="623941" rtl="0" eaLnBrk="1" latinLnBrk="0" hangingPunct="1">
         <a:lnSpc>
           <a:spcPct val="90000"/>
         </a:lnSpc>
@@ -2928,7 +3210,7 @@
       <a:defPPr>
         <a:defRPr lang="en-US"/>
       </a:defPPr>
-      <a:lvl1pPr marL="0" algn="l" defTabSz="623987" rtl="0" eaLnBrk="1" latinLnBrk="0" hangingPunct="1">
+      <a:lvl1pPr marL="0" algn="l" defTabSz="623941" rtl="0" eaLnBrk="1" latinLnBrk="0" hangingPunct="1">
         <a:defRPr sz="1228" kern="1200">
           <a:solidFill>
             <a:schemeClr val="tx1"/>
@@ -2938,7 +3220,7 @@
           <a:cs typeface="+mn-cs"/>
         </a:defRPr>
       </a:lvl1pPr>
-      <a:lvl2pPr marL="311993" algn="l" defTabSz="623987" rtl="0" eaLnBrk="1" latinLnBrk="0" hangingPunct="1">
+      <a:lvl2pPr marL="311970" algn="l" defTabSz="623941" rtl="0" eaLnBrk="1" latinLnBrk="0" hangingPunct="1">
         <a:defRPr sz="1228" kern="1200">
           <a:solidFill>
             <a:schemeClr val="tx1"/>
@@ -2948,7 +3230,7 @@
           <a:cs typeface="+mn-cs"/>
         </a:defRPr>
       </a:lvl2pPr>
-      <a:lvl3pPr marL="623987" algn="l" defTabSz="623987" rtl="0" eaLnBrk="1" latinLnBrk="0" hangingPunct="1">
+      <a:lvl3pPr marL="623941" algn="l" defTabSz="623941" rtl="0" eaLnBrk="1" latinLnBrk="0" hangingPunct="1">
         <a:defRPr sz="1228" kern="1200">
           <a:solidFill>
             <a:schemeClr val="tx1"/>
@@ -2958,7 +3240,7 @@
           <a:cs typeface="+mn-cs"/>
         </a:defRPr>
       </a:lvl3pPr>
-      <a:lvl4pPr marL="935980" algn="l" defTabSz="623987" rtl="0" eaLnBrk="1" latinLnBrk="0" hangingPunct="1">
+      <a:lvl4pPr marL="935911" algn="l" defTabSz="623941" rtl="0" eaLnBrk="1" latinLnBrk="0" hangingPunct="1">
         <a:defRPr sz="1228" kern="1200">
           <a:solidFill>
             <a:schemeClr val="tx1"/>
@@ -2968,7 +3250,7 @@
           <a:cs typeface="+mn-cs"/>
         </a:defRPr>
       </a:lvl4pPr>
-      <a:lvl5pPr marL="1247973" algn="l" defTabSz="623987" rtl="0" eaLnBrk="1" latinLnBrk="0" hangingPunct="1">
+      <a:lvl5pPr marL="1247881" algn="l" defTabSz="623941" rtl="0" eaLnBrk="1" latinLnBrk="0" hangingPunct="1">
         <a:defRPr sz="1228" kern="1200">
           <a:solidFill>
             <a:schemeClr val="tx1"/>
@@ -2978,7 +3260,7 @@
           <a:cs typeface="+mn-cs"/>
         </a:defRPr>
       </a:lvl5pPr>
-      <a:lvl6pPr marL="1559966" algn="l" defTabSz="623987" rtl="0" eaLnBrk="1" latinLnBrk="0" hangingPunct="1">
+      <a:lvl6pPr marL="1559851" algn="l" defTabSz="623941" rtl="0" eaLnBrk="1" latinLnBrk="0" hangingPunct="1">
         <a:defRPr sz="1228" kern="1200">
           <a:solidFill>
             <a:schemeClr val="tx1"/>
@@ -2988,7 +3270,7 @@
           <a:cs typeface="+mn-cs"/>
         </a:defRPr>
       </a:lvl6pPr>
-      <a:lvl7pPr marL="1871960" algn="l" defTabSz="623987" rtl="0" eaLnBrk="1" latinLnBrk="0" hangingPunct="1">
+      <a:lvl7pPr marL="1871822" algn="l" defTabSz="623941" rtl="0" eaLnBrk="1" latinLnBrk="0" hangingPunct="1">
         <a:defRPr sz="1228" kern="1200">
           <a:solidFill>
             <a:schemeClr val="tx1"/>
@@ -2998,7 +3280,7 @@
           <a:cs typeface="+mn-cs"/>
         </a:defRPr>
       </a:lvl7pPr>
-      <a:lvl8pPr marL="2183953" algn="l" defTabSz="623987" rtl="0" eaLnBrk="1" latinLnBrk="0" hangingPunct="1">
+      <a:lvl8pPr marL="2183792" algn="l" defTabSz="623941" rtl="0" eaLnBrk="1" latinLnBrk="0" hangingPunct="1">
         <a:defRPr sz="1228" kern="1200">
           <a:solidFill>
             <a:schemeClr val="tx1"/>
@@ -3008,7 +3290,7 @@
           <a:cs typeface="+mn-cs"/>
         </a:defRPr>
       </a:lvl8pPr>
-      <a:lvl9pPr marL="2495946" algn="l" defTabSz="623987" rtl="0" eaLnBrk="1" latinLnBrk="0" hangingPunct="1">
+      <a:lvl9pPr marL="2495763" algn="l" defTabSz="623941" rtl="0" eaLnBrk="1" latinLnBrk="0" hangingPunct="1">
         <a:defRPr sz="1228" kern="1200">
           <a:solidFill>
             <a:schemeClr val="tx1"/>

</xml_diff>

<commit_message>
Formatting, additional Policyanalyser diagrams
</commit_message>
<xml_diff>
--- a/images/experiments/svg_template.pptx
+++ b/images/experiments/svg_template.pptx
@@ -115,7 +115,7 @@
 <file path=ppt/revisionInfo.xml><?xml version="1.0" encoding="utf-8"?>
 <p1510:revInfo xmlns:a="http://schemas.openxmlformats.org/drawingml/2006/main" xmlns:r="http://schemas.openxmlformats.org/officeDocument/2006/relationships" xmlns:p1510="http://schemas.microsoft.com/office/powerpoint/2015/10/main">
   <p1510:revLst>
-    <p1510:client id="{F6540EED-7EC4-4CE2-BCD2-8A52ACCFB0D8}" v="33" dt="2022-06-26T10:25:40.917"/>
+    <p1510:client id="{F6540EED-7EC4-4CE2-BCD2-8A52ACCFB0D8}" v="35" dt="2022-06-26T19:57:03.465"/>
   </p1510:revLst>
 </p1510:revInfo>
 </file>
@@ -149,12 +149,12 @@
   <pc:docChgLst>
     <pc:chgData name="Nikkel Mollenhauer" userId="c1ec013b5ec7a53d" providerId="LiveId" clId="{F6540EED-7EC4-4CE2-BCD2-8A52ACCFB0D8}"/>
     <pc:docChg chg="undo custSel modSld modMainMaster">
-      <pc:chgData name="Nikkel Mollenhauer" userId="c1ec013b5ec7a53d" providerId="LiveId" clId="{F6540EED-7EC4-4CE2-BCD2-8A52ACCFB0D8}" dt="2022-06-26T10:25:40.916" v="160" actId="14826"/>
+      <pc:chgData name="Nikkel Mollenhauer" userId="c1ec013b5ec7a53d" providerId="LiveId" clId="{F6540EED-7EC4-4CE2-BCD2-8A52ACCFB0D8}" dt="2022-06-26T19:57:03.465" v="162" actId="14826"/>
       <pc:docMkLst>
         <pc:docMk/>
       </pc:docMkLst>
       <pc:sldChg chg="addSp delSp modSp mod">
-        <pc:chgData name="Nikkel Mollenhauer" userId="c1ec013b5ec7a53d" providerId="LiveId" clId="{F6540EED-7EC4-4CE2-BCD2-8A52ACCFB0D8}" dt="2022-06-26T10:25:40.916" v="160" actId="14826"/>
+        <pc:chgData name="Nikkel Mollenhauer" userId="c1ec013b5ec7a53d" providerId="LiveId" clId="{F6540EED-7EC4-4CE2-BCD2-8A52ACCFB0D8}" dt="2022-06-26T19:57:03.465" v="162" actId="14826"/>
         <pc:sldMkLst>
           <pc:docMk/>
           <pc:sldMk cId="1107165603" sldId="256"/>
@@ -3520,7 +3520,7 @@
           </ac:picMkLst>
         </pc:picChg>
         <pc:picChg chg="add mod">
-          <ac:chgData name="Nikkel Mollenhauer" userId="c1ec013b5ec7a53d" providerId="LiveId" clId="{F6540EED-7EC4-4CE2-BCD2-8A52ACCFB0D8}" dt="2022-06-26T10:25:40.916" v="160" actId="14826"/>
+          <ac:chgData name="Nikkel Mollenhauer" userId="c1ec013b5ec7a53d" providerId="LiveId" clId="{F6540EED-7EC4-4CE2-BCD2-8A52ACCFB0D8}" dt="2022-06-26T19:57:03.465" v="162" actId="14826"/>
           <ac:picMkLst>
             <pc:docMk/>
             <pc:sldMk cId="1107165603" sldId="256"/>

</xml_diff>